<commit_message>
made all navbar the same as index.html
banner height made larger

about page banner changed
</commit_message>
<xml_diff>
--- a/img/ppt/banner-images.pptx
+++ b/img/ppt/banner-images.pptx
@@ -9,6 +9,7 @@
     <p:sldId id="257" r:id="rId3"/>
     <p:sldId id="258" r:id="rId4"/>
     <p:sldId id="259" r:id="rId5"/>
+    <p:sldId id="261" r:id="rId6"/>
   </p:sldIdLst>
   <p:sldSz cx="10972800" cy="5486400"/>
   <p:notesSz cx="6858000" cy="9144000"/>
@@ -246,7 +247,7 @@
           <a:p>
             <a:fld id="{9BF0D4B7-B1C8-4A74-AF8C-F9608418881D}" type="datetimeFigureOut">
               <a:rPr lang="en-US" smtClean="0"/>
-              <a:t>1/13/2018</a:t>
+              <a:t>3/19/2018</a:t>
             </a:fld>
             <a:endParaRPr lang="en-US"/>
           </a:p>
@@ -416,7 +417,7 @@
           <a:p>
             <a:fld id="{9BF0D4B7-B1C8-4A74-AF8C-F9608418881D}" type="datetimeFigureOut">
               <a:rPr lang="en-US" smtClean="0"/>
-              <a:t>1/13/2018</a:t>
+              <a:t>3/19/2018</a:t>
             </a:fld>
             <a:endParaRPr lang="en-US"/>
           </a:p>
@@ -596,7 +597,7 @@
           <a:p>
             <a:fld id="{9BF0D4B7-B1C8-4A74-AF8C-F9608418881D}" type="datetimeFigureOut">
               <a:rPr lang="en-US" smtClean="0"/>
-              <a:t>1/13/2018</a:t>
+              <a:t>3/19/2018</a:t>
             </a:fld>
             <a:endParaRPr lang="en-US"/>
           </a:p>
@@ -766,7 +767,7 @@
           <a:p>
             <a:fld id="{9BF0D4B7-B1C8-4A74-AF8C-F9608418881D}" type="datetimeFigureOut">
               <a:rPr lang="en-US" smtClean="0"/>
-              <a:t>1/13/2018</a:t>
+              <a:t>3/19/2018</a:t>
             </a:fld>
             <a:endParaRPr lang="en-US"/>
           </a:p>
@@ -1012,7 +1013,7 @@
           <a:p>
             <a:fld id="{9BF0D4B7-B1C8-4A74-AF8C-F9608418881D}" type="datetimeFigureOut">
               <a:rPr lang="en-US" smtClean="0"/>
-              <a:t>1/13/2018</a:t>
+              <a:t>3/19/2018</a:t>
             </a:fld>
             <a:endParaRPr lang="en-US"/>
           </a:p>
@@ -1244,7 +1245,7 @@
           <a:p>
             <a:fld id="{9BF0D4B7-B1C8-4A74-AF8C-F9608418881D}" type="datetimeFigureOut">
               <a:rPr lang="en-US" smtClean="0"/>
-              <a:t>1/13/2018</a:t>
+              <a:t>3/19/2018</a:t>
             </a:fld>
             <a:endParaRPr lang="en-US"/>
           </a:p>
@@ -1611,7 +1612,7 @@
           <a:p>
             <a:fld id="{9BF0D4B7-B1C8-4A74-AF8C-F9608418881D}" type="datetimeFigureOut">
               <a:rPr lang="en-US" smtClean="0"/>
-              <a:t>1/13/2018</a:t>
+              <a:t>3/19/2018</a:t>
             </a:fld>
             <a:endParaRPr lang="en-US"/>
           </a:p>
@@ -1729,7 +1730,7 @@
           <a:p>
             <a:fld id="{9BF0D4B7-B1C8-4A74-AF8C-F9608418881D}" type="datetimeFigureOut">
               <a:rPr lang="en-US" smtClean="0"/>
-              <a:t>1/13/2018</a:t>
+              <a:t>3/19/2018</a:t>
             </a:fld>
             <a:endParaRPr lang="en-US"/>
           </a:p>
@@ -1824,7 +1825,7 @@
           <a:p>
             <a:fld id="{9BF0D4B7-B1C8-4A74-AF8C-F9608418881D}" type="datetimeFigureOut">
               <a:rPr lang="en-US" smtClean="0"/>
-              <a:t>1/13/2018</a:t>
+              <a:t>3/19/2018</a:t>
             </a:fld>
             <a:endParaRPr lang="en-US"/>
           </a:p>
@@ -2101,7 +2102,7 @@
           <a:p>
             <a:fld id="{9BF0D4B7-B1C8-4A74-AF8C-F9608418881D}" type="datetimeFigureOut">
               <a:rPr lang="en-US" smtClean="0"/>
-              <a:t>1/13/2018</a:t>
+              <a:t>3/19/2018</a:t>
             </a:fld>
             <a:endParaRPr lang="en-US"/>
           </a:p>
@@ -2358,7 +2359,7 @@
           <a:p>
             <a:fld id="{9BF0D4B7-B1C8-4A74-AF8C-F9608418881D}" type="datetimeFigureOut">
               <a:rPr lang="en-US" smtClean="0"/>
-              <a:t>1/13/2018</a:t>
+              <a:t>3/19/2018</a:t>
             </a:fld>
             <a:endParaRPr lang="en-US"/>
           </a:p>
@@ -2571,7 +2572,7 @@
           <a:p>
             <a:fld id="{9BF0D4B7-B1C8-4A74-AF8C-F9608418881D}" type="datetimeFigureOut">
               <a:rPr lang="en-US" smtClean="0"/>
-              <a:t>1/13/2018</a:t>
+              <a:t>3/19/2018</a:t>
             </a:fld>
             <a:endParaRPr lang="en-US"/>
           </a:p>
@@ -3135,6 +3136,50 @@
 </p:sld>
 </file>
 
+<file path=ppt/slides/slide5.xml><?xml version="1.0" encoding="utf-8"?>
+<p:sld xmlns:a="http://schemas.openxmlformats.org/drawingml/2006/main" xmlns:r="http://schemas.openxmlformats.org/officeDocument/2006/relationships" xmlns:p="http://schemas.openxmlformats.org/presentationml/2006/main">
+  <p:cSld>
+    <p:bg>
+      <p:bgPr>
+        <a:blipFill dpi="0" rotWithShape="1">
+          <a:blip r:embed="rId2">
+            <a:lum/>
+          </a:blip>
+          <a:srcRect/>
+          <a:stretch>
+            <a:fillRect t="-16000" b="-16000"/>
+          </a:stretch>
+        </a:blipFill>
+        <a:effectLst/>
+      </p:bgPr>
+    </p:bg>
+    <p:spTree>
+      <p:nvGrpSpPr>
+        <p:cNvPr id="1" name=""/>
+        <p:cNvGrpSpPr/>
+        <p:nvPr/>
+      </p:nvGrpSpPr>
+      <p:grpSpPr>
+        <a:xfrm>
+          <a:off x="0" y="0"/>
+          <a:ext cx="0" cy="0"/>
+          <a:chOff x="0" y="0"/>
+          <a:chExt cx="0" cy="0"/>
+        </a:xfrm>
+      </p:grpSpPr>
+    </p:spTree>
+    <p:extLst>
+      <p:ext uri="{BB962C8B-B14F-4D97-AF65-F5344CB8AC3E}">
+        <p14:creationId xmlns:p14="http://schemas.microsoft.com/office/powerpoint/2010/main" val="3154240289"/>
+      </p:ext>
+    </p:extLst>
+  </p:cSld>
+  <p:clrMapOvr>
+    <a:masterClrMapping/>
+  </p:clrMapOvr>
+</p:sld>
+</file>
+
 <file path=ppt/theme/theme1.xml><?xml version="1.0" encoding="utf-8"?>
 <a:theme xmlns:a="http://schemas.openxmlformats.org/drawingml/2006/main" name="Office Theme">
   <a:themeElements>

</xml_diff>

<commit_message>
applied navbar and footer changes to about page
changed the banner image
</commit_message>
<xml_diff>
--- a/img/ppt/banner-images.pptx
+++ b/img/ppt/banner-images.pptx
@@ -9,7 +9,6 @@
     <p:sldId id="257" r:id="rId3"/>
     <p:sldId id="258" r:id="rId4"/>
     <p:sldId id="259" r:id="rId5"/>
-    <p:sldId id="261" r:id="rId6"/>
   </p:sldIdLst>
   <p:sldSz cx="10972800" cy="5486400"/>
   <p:notesSz cx="6858000" cy="9144000"/>
@@ -247,7 +246,7 @@
           <a:p>
             <a:fld id="{9BF0D4B7-B1C8-4A74-AF8C-F9608418881D}" type="datetimeFigureOut">
               <a:rPr lang="en-US" smtClean="0"/>
-              <a:t>3/19/2018</a:t>
+              <a:t>5/5/2018</a:t>
             </a:fld>
             <a:endParaRPr lang="en-US"/>
           </a:p>
@@ -417,7 +416,7 @@
           <a:p>
             <a:fld id="{9BF0D4B7-B1C8-4A74-AF8C-F9608418881D}" type="datetimeFigureOut">
               <a:rPr lang="en-US" smtClean="0"/>
-              <a:t>3/19/2018</a:t>
+              <a:t>5/5/2018</a:t>
             </a:fld>
             <a:endParaRPr lang="en-US"/>
           </a:p>
@@ -597,7 +596,7 @@
           <a:p>
             <a:fld id="{9BF0D4B7-B1C8-4A74-AF8C-F9608418881D}" type="datetimeFigureOut">
               <a:rPr lang="en-US" smtClean="0"/>
-              <a:t>3/19/2018</a:t>
+              <a:t>5/5/2018</a:t>
             </a:fld>
             <a:endParaRPr lang="en-US"/>
           </a:p>
@@ -767,7 +766,7 @@
           <a:p>
             <a:fld id="{9BF0D4B7-B1C8-4A74-AF8C-F9608418881D}" type="datetimeFigureOut">
               <a:rPr lang="en-US" smtClean="0"/>
-              <a:t>3/19/2018</a:t>
+              <a:t>5/5/2018</a:t>
             </a:fld>
             <a:endParaRPr lang="en-US"/>
           </a:p>
@@ -1013,7 +1012,7 @@
           <a:p>
             <a:fld id="{9BF0D4B7-B1C8-4A74-AF8C-F9608418881D}" type="datetimeFigureOut">
               <a:rPr lang="en-US" smtClean="0"/>
-              <a:t>3/19/2018</a:t>
+              <a:t>5/5/2018</a:t>
             </a:fld>
             <a:endParaRPr lang="en-US"/>
           </a:p>
@@ -1245,7 +1244,7 @@
           <a:p>
             <a:fld id="{9BF0D4B7-B1C8-4A74-AF8C-F9608418881D}" type="datetimeFigureOut">
               <a:rPr lang="en-US" smtClean="0"/>
-              <a:t>3/19/2018</a:t>
+              <a:t>5/5/2018</a:t>
             </a:fld>
             <a:endParaRPr lang="en-US"/>
           </a:p>
@@ -1612,7 +1611,7 @@
           <a:p>
             <a:fld id="{9BF0D4B7-B1C8-4A74-AF8C-F9608418881D}" type="datetimeFigureOut">
               <a:rPr lang="en-US" smtClean="0"/>
-              <a:t>3/19/2018</a:t>
+              <a:t>5/5/2018</a:t>
             </a:fld>
             <a:endParaRPr lang="en-US"/>
           </a:p>
@@ -1730,7 +1729,7 @@
           <a:p>
             <a:fld id="{9BF0D4B7-B1C8-4A74-AF8C-F9608418881D}" type="datetimeFigureOut">
               <a:rPr lang="en-US" smtClean="0"/>
-              <a:t>3/19/2018</a:t>
+              <a:t>5/5/2018</a:t>
             </a:fld>
             <a:endParaRPr lang="en-US"/>
           </a:p>
@@ -1825,7 +1824,7 @@
           <a:p>
             <a:fld id="{9BF0D4B7-B1C8-4A74-AF8C-F9608418881D}" type="datetimeFigureOut">
               <a:rPr lang="en-US" smtClean="0"/>
-              <a:t>3/19/2018</a:t>
+              <a:t>5/5/2018</a:t>
             </a:fld>
             <a:endParaRPr lang="en-US"/>
           </a:p>
@@ -2102,7 +2101,7 @@
           <a:p>
             <a:fld id="{9BF0D4B7-B1C8-4A74-AF8C-F9608418881D}" type="datetimeFigureOut">
               <a:rPr lang="en-US" smtClean="0"/>
-              <a:t>3/19/2018</a:t>
+              <a:t>5/5/2018</a:t>
             </a:fld>
             <a:endParaRPr lang="en-US"/>
           </a:p>
@@ -2359,7 +2358,7 @@
           <a:p>
             <a:fld id="{9BF0D4B7-B1C8-4A74-AF8C-F9608418881D}" type="datetimeFigureOut">
               <a:rPr lang="en-US" smtClean="0"/>
-              <a:t>3/19/2018</a:t>
+              <a:t>5/5/2018</a:t>
             </a:fld>
             <a:endParaRPr lang="en-US"/>
           </a:p>
@@ -2572,7 +2571,7 @@
           <a:p>
             <a:fld id="{9BF0D4B7-B1C8-4A74-AF8C-F9608418881D}" type="datetimeFigureOut">
               <a:rPr lang="en-US" smtClean="0"/>
-              <a:t>3/19/2018</a:t>
+              <a:t>5/5/2018</a:t>
             </a:fld>
             <a:endParaRPr lang="en-US"/>
           </a:p>
@@ -2971,7 +2970,7 @@
           </a:blip>
           <a:srcRect/>
           <a:stretch>
-            <a:fillRect t="-24000" b="-10000"/>
+            <a:fillRect/>
           </a:stretch>
         </a:blipFill>
         <a:effectLst/>
@@ -2991,6 +2990,76 @@
           <a:chExt cx="0" cy="0"/>
         </a:xfrm>
       </p:grpSpPr>
+      <p:sp>
+        <p:nvSpPr>
+          <p:cNvPr id="2" name="Rectangle 1"/>
+          <p:cNvSpPr/>
+          <p:nvPr/>
+        </p:nvSpPr>
+        <p:spPr>
+          <a:xfrm>
+            <a:off x="0" y="0"/>
+            <a:ext cx="10972800" cy="5486400"/>
+          </a:xfrm>
+          <a:prstGeom prst="rect">
+            <a:avLst/>
+          </a:prstGeom>
+          <a:gradFill flip="none" rotWithShape="1">
+            <a:gsLst>
+              <a:gs pos="0">
+                <a:schemeClr val="bg1">
+                  <a:alpha val="0"/>
+                </a:schemeClr>
+              </a:gs>
+              <a:gs pos="88000">
+                <a:srgbClr val="000000">
+                  <a:alpha val="30000"/>
+                </a:srgbClr>
+              </a:gs>
+              <a:gs pos="70000">
+                <a:schemeClr val="bg1">
+                  <a:lumMod val="95000"/>
+                  <a:alpha val="5000"/>
+                </a:schemeClr>
+              </a:gs>
+              <a:gs pos="100000">
+                <a:schemeClr val="tx1">
+                  <a:alpha val="45000"/>
+                </a:schemeClr>
+              </a:gs>
+            </a:gsLst>
+            <a:lin ang="16200000" scaled="1"/>
+            <a:tileRect/>
+          </a:gradFill>
+          <a:ln>
+            <a:noFill/>
+          </a:ln>
+        </p:spPr>
+        <p:style>
+          <a:lnRef idx="2">
+            <a:schemeClr val="accent1">
+              <a:shade val="50000"/>
+            </a:schemeClr>
+          </a:lnRef>
+          <a:fillRef idx="1">
+            <a:schemeClr val="accent1"/>
+          </a:fillRef>
+          <a:effectRef idx="0">
+            <a:schemeClr val="accent1"/>
+          </a:effectRef>
+          <a:fontRef idx="minor">
+            <a:schemeClr val="lt1"/>
+          </a:fontRef>
+        </p:style>
+        <p:txBody>
+          <a:bodyPr rtlCol="0" anchor="ctr"/>
+          <a:lstStyle/>
+          <a:p>
+            <a:pPr algn="ctr"/>
+            <a:endParaRPr lang="en-US"/>
+          </a:p>
+        </p:txBody>
+      </p:sp>
     </p:spTree>
     <p:extLst>
       <p:ext uri="{BB962C8B-B14F-4D97-AF65-F5344CB8AC3E}">
@@ -3127,50 +3196,6 @@
     <p:extLst>
       <p:ext uri="{BB962C8B-B14F-4D97-AF65-F5344CB8AC3E}">
         <p14:creationId xmlns:p14="http://schemas.microsoft.com/office/powerpoint/2010/main" val="4002726040"/>
-      </p:ext>
-    </p:extLst>
-  </p:cSld>
-  <p:clrMapOvr>
-    <a:masterClrMapping/>
-  </p:clrMapOvr>
-</p:sld>
-</file>
-
-<file path=ppt/slides/slide5.xml><?xml version="1.0" encoding="utf-8"?>
-<p:sld xmlns:a="http://schemas.openxmlformats.org/drawingml/2006/main" xmlns:r="http://schemas.openxmlformats.org/officeDocument/2006/relationships" xmlns:p="http://schemas.openxmlformats.org/presentationml/2006/main">
-  <p:cSld>
-    <p:bg>
-      <p:bgPr>
-        <a:blipFill dpi="0" rotWithShape="1">
-          <a:blip r:embed="rId2">
-            <a:lum/>
-          </a:blip>
-          <a:srcRect/>
-          <a:stretch>
-            <a:fillRect t="-16000" b="-16000"/>
-          </a:stretch>
-        </a:blipFill>
-        <a:effectLst/>
-      </p:bgPr>
-    </p:bg>
-    <p:spTree>
-      <p:nvGrpSpPr>
-        <p:cNvPr id="1" name=""/>
-        <p:cNvGrpSpPr/>
-        <p:nvPr/>
-      </p:nvGrpSpPr>
-      <p:grpSpPr>
-        <a:xfrm>
-          <a:off x="0" y="0"/>
-          <a:ext cx="0" cy="0"/>
-          <a:chOff x="0" y="0"/>
-          <a:chExt cx="0" cy="0"/>
-        </a:xfrm>
-      </p:grpSpPr>
-    </p:spTree>
-    <p:extLst>
-      <p:ext uri="{BB962C8B-B14F-4D97-AF65-F5344CB8AC3E}">
-        <p14:creationId xmlns:p14="http://schemas.microsoft.com/office/powerpoint/2010/main" val="3154240289"/>
       </p:ext>
     </p:extLst>
   </p:cSld>

</xml_diff>